<commit_message>
add SWoT in an Interview
</commit_message>
<xml_diff>
--- a/Discussions/Head Loss.pptx
+++ b/Discussions/Head Loss.pptx
@@ -5,45 +5,42 @@
     <p:sldMasterId id="2147483718" r:id="rId1"/>
   </p:sldMasterIdLst>
   <p:notesMasterIdLst>
-    <p:notesMasterId r:id="rId11"/>
+    <p:notesMasterId r:id="rId8"/>
   </p:notesMasterIdLst>
   <p:handoutMasterIdLst>
-    <p:handoutMasterId r:id="rId12"/>
+    <p:handoutMasterId r:id="rId9"/>
   </p:handoutMasterIdLst>
   <p:sldIdLst>
-    <p:sldId id="531" r:id="rId2"/>
-    <p:sldId id="532" r:id="rId3"/>
-    <p:sldId id="533" r:id="rId4"/>
-    <p:sldId id="495" r:id="rId5"/>
-    <p:sldId id="360" r:id="rId6"/>
-    <p:sldId id="528" r:id="rId7"/>
-    <p:sldId id="529" r:id="rId8"/>
-    <p:sldId id="527" r:id="rId9"/>
-    <p:sldId id="530" r:id="rId10"/>
+    <p:sldId id="495" r:id="rId2"/>
+    <p:sldId id="360" r:id="rId3"/>
+    <p:sldId id="528" r:id="rId4"/>
+    <p:sldId id="529" r:id="rId5"/>
+    <p:sldId id="527" r:id="rId6"/>
+    <p:sldId id="530" r:id="rId7"/>
   </p:sldIdLst>
   <p:sldSz cx="12192000" cy="6858000"/>
   <p:notesSz cx="7315200" cy="9601200"/>
   <p:embeddedFontLst>
     <p:embeddedFont>
       <p:font typeface="Calibri" panose="020F0502020204030204" pitchFamily="34" charset="0"/>
-      <p:regular r:id="rId13"/>
-      <p:bold r:id="rId14"/>
-      <p:italic r:id="rId15"/>
-      <p:boldItalic r:id="rId16"/>
+      <p:regular r:id="rId10"/>
+      <p:bold r:id="rId11"/>
+      <p:italic r:id="rId12"/>
+      <p:boldItalic r:id="rId13"/>
     </p:embeddedFont>
     <p:embeddedFont>
       <p:font typeface="Candara" panose="020E0502030303020204" pitchFamily="34" charset="0"/>
-      <p:regular r:id="rId17"/>
-      <p:bold r:id="rId18"/>
-      <p:italic r:id="rId19"/>
-      <p:boldItalic r:id="rId20"/>
+      <p:regular r:id="rId14"/>
+      <p:bold r:id="rId15"/>
+      <p:italic r:id="rId16"/>
+      <p:boldItalic r:id="rId17"/>
     </p:embeddedFont>
     <p:embeddedFont>
       <p:font typeface="Century Gothic" panose="020B0502020202020204" pitchFamily="34" charset="0"/>
-      <p:regular r:id="rId21"/>
-      <p:bold r:id="rId22"/>
-      <p:italic r:id="rId23"/>
-      <p:boldItalic r:id="rId24"/>
+      <p:regular r:id="rId18"/>
+      <p:bold r:id="rId19"/>
+      <p:italic r:id="rId20"/>
+      <p:boldItalic r:id="rId21"/>
     </p:embeddedFont>
   </p:embeddedFontLst>
   <p:defaultTextStyle>
@@ -897,103 +894,6 @@
       </p:grpSpPr>
       <p:sp>
         <p:nvSpPr>
-          <p:cNvPr id="2" name="Slide Image Placeholder 1"/>
-          <p:cNvSpPr>
-            <a:spLocks noGrp="1" noRot="1" noChangeAspect="1"/>
-          </p:cNvSpPr>
-          <p:nvPr>
-            <p:ph type="sldImg"/>
-          </p:nvPr>
-        </p:nvSpPr>
-        <p:spPr>
-          <a:xfrm>
-            <a:off x="457200" y="720725"/>
-            <a:ext cx="6400800" cy="3600450"/>
-          </a:xfrm>
-        </p:spPr>
-      </p:sp>
-      <p:sp>
-        <p:nvSpPr>
-          <p:cNvPr id="3" name="Notes Placeholder 2"/>
-          <p:cNvSpPr>
-            <a:spLocks noGrp="1"/>
-          </p:cNvSpPr>
-          <p:nvPr>
-            <p:ph type="body" idx="1"/>
-          </p:nvPr>
-        </p:nvSpPr>
-        <p:spPr/>
-        <p:txBody>
-          <a:bodyPr/>
-          <a:lstStyle/>
-          <a:p>
-            <a:r>
-              <a:rPr lang="en-US" dirty="0" err="1"/>
-              <a:t>Featurescript</a:t>
-            </a:r>
-            <a:r>
-              <a:rPr lang="en-US" dirty="0"/>
-              <a:t> equations for pipe flow will help here!</a:t>
-            </a:r>
-          </a:p>
-        </p:txBody>
-      </p:sp>
-      <p:sp>
-        <p:nvSpPr>
-          <p:cNvPr id="4" name="Slide Number Placeholder 3"/>
-          <p:cNvSpPr>
-            <a:spLocks noGrp="1"/>
-          </p:cNvSpPr>
-          <p:nvPr>
-            <p:ph type="sldNum" sz="quarter" idx="5"/>
-          </p:nvPr>
-        </p:nvSpPr>
-        <p:spPr/>
-        <p:txBody>
-          <a:bodyPr/>
-          <a:lstStyle/>
-          <a:p>
-            <a:fld id="{7913D7C8-1D10-4E5B-8A9B-B2BE7F2B7605}" type="slidenum">
-              <a:rPr lang="en-US" smtClean="0"/>
-              <a:pPr/>
-              <a:t>3</a:t>
-            </a:fld>
-            <a:endParaRPr lang="en-US"/>
-          </a:p>
-        </p:txBody>
-      </p:sp>
-    </p:spTree>
-    <p:extLst>
-      <p:ext uri="{BB962C8B-B14F-4D97-AF65-F5344CB8AC3E}">
-        <p14:creationId xmlns:p14="http://schemas.microsoft.com/office/powerpoint/2010/main" val="3177362544"/>
-      </p:ext>
-    </p:extLst>
-  </p:cSld>
-  <p:clrMapOvr>
-    <a:masterClrMapping/>
-  </p:clrMapOvr>
-</p:notes>
-</file>
-
-<file path=ppt/notesSlides/notesSlide2.xml><?xml version="1.0" encoding="utf-8"?>
-<p:notes xmlns:a="http://schemas.openxmlformats.org/drawingml/2006/main" xmlns:r="http://schemas.openxmlformats.org/officeDocument/2006/relationships" xmlns:p="http://schemas.openxmlformats.org/presentationml/2006/main">
-  <p:cSld>
-    <p:spTree>
-      <p:nvGrpSpPr>
-        <p:cNvPr id="1" name=""/>
-        <p:cNvGrpSpPr/>
-        <p:nvPr/>
-      </p:nvGrpSpPr>
-      <p:grpSpPr>
-        <a:xfrm>
-          <a:off x="0" y="0"/>
-          <a:ext cx="0" cy="0"/>
-          <a:chOff x="0" y="0"/>
-          <a:chExt cx="0" cy="0"/>
-        </a:xfrm>
-      </p:grpSpPr>
-      <p:sp>
-        <p:nvSpPr>
           <p:cNvPr id="7" name="Rectangle 7"/>
           <p:cNvSpPr>
             <a:spLocks noGrp="1" noChangeArrowheads="1"/>
@@ -1012,7 +912,7 @@
             <a:fld id="{F5A6E741-3498-406C-996F-BD426169E973}" type="slidenum">
               <a:rPr lang="en-US"/>
               <a:pPr/>
-              <a:t>4</a:t>
+              <a:t>1</a:t>
             </a:fld>
             <a:endParaRPr lang="en-US"/>
           </a:p>
@@ -1068,7 +968,7 @@
 </p:notes>
 </file>
 
-<file path=ppt/notesSlides/notesSlide3.xml><?xml version="1.0" encoding="utf-8"?>
+<file path=ppt/notesSlides/notesSlide2.xml><?xml version="1.0" encoding="utf-8"?>
 <p:notes xmlns:a="http://schemas.openxmlformats.org/drawingml/2006/main" xmlns:r="http://schemas.openxmlformats.org/officeDocument/2006/relationships" xmlns:p="http://schemas.openxmlformats.org/presentationml/2006/main">
   <p:cSld>
     <p:spTree>
@@ -1105,7 +1005,7 @@
             <a:fld id="{095099EF-FE16-4F89-A334-AC1F82364EA9}" type="slidenum">
               <a:rPr lang="en-US"/>
               <a:pPr/>
-              <a:t>5</a:t>
+              <a:t>2</a:t>
             </a:fld>
             <a:endParaRPr lang="en-US"/>
           </a:p>
@@ -1161,7 +1061,7 @@
 </p:notes>
 </file>
 
-<file path=ppt/notesSlides/notesSlide4.xml><?xml version="1.0" encoding="utf-8"?>
+<file path=ppt/notesSlides/notesSlide3.xml><?xml version="1.0" encoding="utf-8"?>
 <p:notes xmlns:a="http://schemas.openxmlformats.org/drawingml/2006/main" xmlns:r="http://schemas.openxmlformats.org/officeDocument/2006/relationships" xmlns:p="http://schemas.openxmlformats.org/presentationml/2006/main">
   <p:cSld>
     <p:spTree>
@@ -1253,7 +1153,7 @@
             <a:fld id="{7913D7C8-1D10-4E5B-8A9B-B2BE7F2B7605}" type="slidenum">
               <a:rPr lang="en-US" smtClean="0"/>
               <a:pPr/>
-              <a:t>7</a:t>
+              <a:t>4</a:t>
             </a:fld>
             <a:endParaRPr lang="en-US"/>
           </a:p>
@@ -2658,7 +2558,7 @@
           <a:p>
             <a:fld id="{216E0E02-55D8-4A62-964B-783B05293A72}" type="datetimeFigureOut">
               <a:rPr lang="es-HN" smtClean="0"/>
-              <a:t>24/1/2023</a:t>
+              <a:t>31/1/2023</a:t>
             </a:fld>
             <a:endParaRPr lang="es-HN"/>
           </a:p>
@@ -3521,981 +3421,6 @@
 </file>
 
 <file path=ppt/slides/slide1.xml><?xml version="1.0" encoding="utf-8"?>
-<p:sld xmlns:a="http://schemas.openxmlformats.org/drawingml/2006/main" xmlns:r="http://schemas.openxmlformats.org/officeDocument/2006/relationships" xmlns:p="http://schemas.openxmlformats.org/presentationml/2006/main">
-  <p:cSld>
-    <p:spTree>
-      <p:nvGrpSpPr>
-        <p:cNvPr id="1" name=""/>
-        <p:cNvGrpSpPr/>
-        <p:nvPr/>
-      </p:nvGrpSpPr>
-      <p:grpSpPr>
-        <a:xfrm>
-          <a:off x="0" y="0"/>
-          <a:ext cx="0" cy="0"/>
-          <a:chOff x="0" y="0"/>
-          <a:chExt cx="0" cy="0"/>
-        </a:xfrm>
-      </p:grpSpPr>
-      <p:sp>
-        <p:nvSpPr>
-          <p:cNvPr id="2" name="Title 1">
-            <a:extLst>
-              <a:ext uri="{FF2B5EF4-FFF2-40B4-BE49-F238E27FC236}">
-                <a16:creationId xmlns:a16="http://schemas.microsoft.com/office/drawing/2014/main" id="{E8187804-8C73-4FE1-A550-763995E3C2AA}"/>
-              </a:ext>
-            </a:extLst>
-          </p:cNvPr>
-          <p:cNvSpPr>
-            <a:spLocks noGrp="1"/>
-          </p:cNvSpPr>
-          <p:nvPr>
-            <p:ph type="title"/>
-          </p:nvPr>
-        </p:nvSpPr>
-        <p:spPr/>
-        <p:txBody>
-          <a:bodyPr/>
-          <a:lstStyle/>
-          <a:p>
-            <a:r>
-              <a:rPr lang="en-US" dirty="0"/>
-              <a:t>Student Questions</a:t>
-            </a:r>
-          </a:p>
-        </p:txBody>
-      </p:sp>
-      <p:sp>
-        <p:nvSpPr>
-          <p:cNvPr id="3" name="Content Placeholder 2">
-            <a:extLst>
-              <a:ext uri="{FF2B5EF4-FFF2-40B4-BE49-F238E27FC236}">
-                <a16:creationId xmlns:a16="http://schemas.microsoft.com/office/drawing/2014/main" id="{28D29EAA-3BDB-45BD-9DCB-BBCFE592BD9F}"/>
-              </a:ext>
-            </a:extLst>
-          </p:cNvPr>
-          <p:cNvSpPr>
-            <a:spLocks noGrp="1"/>
-          </p:cNvSpPr>
-          <p:nvPr>
-            <p:ph idx="1"/>
-          </p:nvPr>
-        </p:nvSpPr>
-        <p:spPr/>
-        <p:txBody>
-          <a:bodyPr/>
-          <a:lstStyle/>
-          <a:p>
-            <a:r>
-              <a:rPr lang="en-US" dirty="0"/>
-              <a:t>Does the BOM reflect updated costs?</a:t>
-            </a:r>
-          </a:p>
-          <a:p>
-            <a:r>
-              <a:rPr lang="en-US" dirty="0"/>
-              <a:t>What is the best method to learn </a:t>
-            </a:r>
-            <a:r>
-              <a:rPr lang="en-US" dirty="0" err="1"/>
-              <a:t>Onshape</a:t>
-            </a:r>
-            <a:r>
-              <a:rPr lang="en-US" dirty="0"/>
-              <a:t>?</a:t>
-            </a:r>
-          </a:p>
-          <a:p>
-            <a:r>
-              <a:rPr lang="en-US" dirty="0"/>
-              <a:t>What else can it be used for?</a:t>
-            </a:r>
-            <a:br>
-              <a:rPr lang="en-US" dirty="0"/>
-            </a:br>
-            <a:endParaRPr lang="en-US" dirty="0"/>
-          </a:p>
-          <a:p>
-            <a:endParaRPr lang="en-US" dirty="0"/>
-          </a:p>
-        </p:txBody>
-      </p:sp>
-    </p:spTree>
-    <p:extLst>
-      <p:ext uri="{BB962C8B-B14F-4D97-AF65-F5344CB8AC3E}">
-        <p14:creationId xmlns:p14="http://schemas.microsoft.com/office/powerpoint/2010/main" val="1192998806"/>
-      </p:ext>
-    </p:extLst>
-  </p:cSld>
-  <p:clrMapOvr>
-    <a:masterClrMapping/>
-  </p:clrMapOvr>
-  <p:transition>
-    <p:fade/>
-  </p:transition>
-  <p:timing>
-    <p:tnLst>
-      <p:par>
-        <p:cTn id="1" dur="indefinite" restart="never" nodeType="tmRoot">
-          <p:childTnLst>
-            <p:seq concurrent="1" nextAc="seek">
-              <p:cTn id="2" dur="indefinite" nodeType="mainSeq">
-                <p:childTnLst>
-                  <p:par>
-                    <p:cTn id="3" fill="hold">
-                      <p:stCondLst>
-                        <p:cond delay="indefinite"/>
-                      </p:stCondLst>
-                      <p:childTnLst>
-                        <p:par>
-                          <p:cTn id="4" fill="hold">
-                            <p:stCondLst>
-                              <p:cond delay="0"/>
-                            </p:stCondLst>
-                            <p:childTnLst>
-                              <p:par>
-                                <p:cTn id="5" presetID="1" presetClass="entr" presetSubtype="0" fill="hold" grpId="0" nodeType="clickEffect">
-                                  <p:stCondLst>
-                                    <p:cond delay="0"/>
-                                  </p:stCondLst>
-                                  <p:childTnLst>
-                                    <p:set>
-                                      <p:cBhvr>
-                                        <p:cTn id="6" dur="1" fill="hold">
-                                          <p:stCondLst>
-                                            <p:cond delay="0"/>
-                                          </p:stCondLst>
-                                        </p:cTn>
-                                        <p:tgtEl>
-                                          <p:spTgt spid="3">
-                                            <p:txEl>
-                                              <p:pRg st="0" end="0"/>
-                                            </p:txEl>
-                                          </p:spTgt>
-                                        </p:tgtEl>
-                                        <p:attrNameLst>
-                                          <p:attrName>style.visibility</p:attrName>
-                                        </p:attrNameLst>
-                                      </p:cBhvr>
-                                      <p:to>
-                                        <p:strVal val="visible"/>
-                                      </p:to>
-                                    </p:set>
-                                  </p:childTnLst>
-                                </p:cTn>
-                              </p:par>
-                            </p:childTnLst>
-                          </p:cTn>
-                        </p:par>
-                      </p:childTnLst>
-                    </p:cTn>
-                  </p:par>
-                  <p:par>
-                    <p:cTn id="7" fill="hold">
-                      <p:stCondLst>
-                        <p:cond delay="indefinite"/>
-                      </p:stCondLst>
-                      <p:childTnLst>
-                        <p:par>
-                          <p:cTn id="8" fill="hold">
-                            <p:stCondLst>
-                              <p:cond delay="0"/>
-                            </p:stCondLst>
-                            <p:childTnLst>
-                              <p:par>
-                                <p:cTn id="9" presetID="1" presetClass="entr" presetSubtype="0" fill="hold" grpId="0" nodeType="clickEffect">
-                                  <p:stCondLst>
-                                    <p:cond delay="0"/>
-                                  </p:stCondLst>
-                                  <p:childTnLst>
-                                    <p:set>
-                                      <p:cBhvr>
-                                        <p:cTn id="10" dur="1" fill="hold">
-                                          <p:stCondLst>
-                                            <p:cond delay="0"/>
-                                          </p:stCondLst>
-                                        </p:cTn>
-                                        <p:tgtEl>
-                                          <p:spTgt spid="3">
-                                            <p:txEl>
-                                              <p:pRg st="1" end="1"/>
-                                            </p:txEl>
-                                          </p:spTgt>
-                                        </p:tgtEl>
-                                        <p:attrNameLst>
-                                          <p:attrName>style.visibility</p:attrName>
-                                        </p:attrNameLst>
-                                      </p:cBhvr>
-                                      <p:to>
-                                        <p:strVal val="visible"/>
-                                      </p:to>
-                                    </p:set>
-                                  </p:childTnLst>
-                                </p:cTn>
-                              </p:par>
-                            </p:childTnLst>
-                          </p:cTn>
-                        </p:par>
-                      </p:childTnLst>
-                    </p:cTn>
-                  </p:par>
-                  <p:par>
-                    <p:cTn id="11" fill="hold">
-                      <p:stCondLst>
-                        <p:cond delay="indefinite"/>
-                      </p:stCondLst>
-                      <p:childTnLst>
-                        <p:par>
-                          <p:cTn id="12" fill="hold">
-                            <p:stCondLst>
-                              <p:cond delay="0"/>
-                            </p:stCondLst>
-                            <p:childTnLst>
-                              <p:par>
-                                <p:cTn id="13" presetID="1" presetClass="entr" presetSubtype="0" fill="hold" grpId="0" nodeType="clickEffect">
-                                  <p:stCondLst>
-                                    <p:cond delay="0"/>
-                                  </p:stCondLst>
-                                  <p:childTnLst>
-                                    <p:set>
-                                      <p:cBhvr>
-                                        <p:cTn id="14" dur="1" fill="hold">
-                                          <p:stCondLst>
-                                            <p:cond delay="0"/>
-                                          </p:stCondLst>
-                                        </p:cTn>
-                                        <p:tgtEl>
-                                          <p:spTgt spid="3">
-                                            <p:txEl>
-                                              <p:pRg st="2" end="2"/>
-                                            </p:txEl>
-                                          </p:spTgt>
-                                        </p:tgtEl>
-                                        <p:attrNameLst>
-                                          <p:attrName>style.visibility</p:attrName>
-                                        </p:attrNameLst>
-                                      </p:cBhvr>
-                                      <p:to>
-                                        <p:strVal val="visible"/>
-                                      </p:to>
-                                    </p:set>
-                                  </p:childTnLst>
-                                </p:cTn>
-                              </p:par>
-                            </p:childTnLst>
-                          </p:cTn>
-                        </p:par>
-                      </p:childTnLst>
-                    </p:cTn>
-                  </p:par>
-                </p:childTnLst>
-              </p:cTn>
-              <p:prevCondLst>
-                <p:cond evt="onPrev" delay="0">
-                  <p:tgtEl>
-                    <p:sldTgt/>
-                  </p:tgtEl>
-                </p:cond>
-              </p:prevCondLst>
-              <p:nextCondLst>
-                <p:cond evt="onNext" delay="0">
-                  <p:tgtEl>
-                    <p:sldTgt/>
-                  </p:tgtEl>
-                </p:cond>
-              </p:nextCondLst>
-            </p:seq>
-          </p:childTnLst>
-        </p:cTn>
-      </p:par>
-    </p:tnLst>
-    <p:bldLst>
-      <p:bldP spid="3" grpId="0" build="p"/>
-    </p:bldLst>
-  </p:timing>
-</p:sld>
-</file>
-
-<file path=ppt/slides/slide2.xml><?xml version="1.0" encoding="utf-8"?>
-<p:sld xmlns:a="http://schemas.openxmlformats.org/drawingml/2006/main" xmlns:r="http://schemas.openxmlformats.org/officeDocument/2006/relationships" xmlns:p="http://schemas.openxmlformats.org/presentationml/2006/main">
-  <p:cSld>
-    <p:spTree>
-      <p:nvGrpSpPr>
-        <p:cNvPr id="1" name=""/>
-        <p:cNvGrpSpPr/>
-        <p:nvPr/>
-      </p:nvGrpSpPr>
-      <p:grpSpPr>
-        <a:xfrm>
-          <a:off x="0" y="0"/>
-          <a:ext cx="0" cy="0"/>
-          <a:chOff x="0" y="0"/>
-          <a:chExt cx="0" cy="0"/>
-        </a:xfrm>
-      </p:grpSpPr>
-      <p:sp>
-        <p:nvSpPr>
-          <p:cNvPr id="2" name="Title 1">
-            <a:extLst>
-              <a:ext uri="{FF2B5EF4-FFF2-40B4-BE49-F238E27FC236}">
-                <a16:creationId xmlns:a16="http://schemas.microsoft.com/office/drawing/2014/main" id="{365ACAF3-CE39-4FE0-9E3C-B8DCF1B45108}"/>
-              </a:ext>
-            </a:extLst>
-          </p:cNvPr>
-          <p:cNvSpPr>
-            <a:spLocks noGrp="1"/>
-          </p:cNvSpPr>
-          <p:nvPr>
-            <p:ph type="title"/>
-          </p:nvPr>
-        </p:nvSpPr>
-        <p:spPr/>
-        <p:txBody>
-          <a:bodyPr/>
-          <a:lstStyle/>
-          <a:p>
-            <a:r>
-              <a:rPr lang="en-US" dirty="0"/>
-              <a:t>Fluids questions</a:t>
-            </a:r>
-          </a:p>
-        </p:txBody>
-      </p:sp>
-      <p:sp>
-        <p:nvSpPr>
-          <p:cNvPr id="3" name="Content Placeholder 2">
-            <a:extLst>
-              <a:ext uri="{FF2B5EF4-FFF2-40B4-BE49-F238E27FC236}">
-                <a16:creationId xmlns:a16="http://schemas.microsoft.com/office/drawing/2014/main" id="{5821BDF8-4A9F-45F8-86D9-E93A2AB1ACBF}"/>
-              </a:ext>
-            </a:extLst>
-          </p:cNvPr>
-          <p:cNvSpPr>
-            <a:spLocks noGrp="1"/>
-          </p:cNvSpPr>
-          <p:nvPr>
-            <p:ph idx="1"/>
-          </p:nvPr>
-        </p:nvSpPr>
-        <p:spPr/>
-        <p:txBody>
-          <a:bodyPr/>
-          <a:lstStyle/>
-          <a:p>
-            <a:r>
-              <a:rPr lang="en-US" dirty="0"/>
-              <a:t>Are the walls within the flocculator that ensure proper mixing and particle collision considered flow control devices? I am just confused on the what the definition of a flow control device is.</a:t>
-            </a:r>
-          </a:p>
-          <a:p>
-            <a:r>
-              <a:rPr lang="en-US" dirty="0"/>
-              <a:t>Why does lower pressure mean more drag?</a:t>
-            </a:r>
-          </a:p>
-          <a:p>
-            <a:r>
-              <a:rPr lang="en-US" dirty="0"/>
-              <a:t>How does the orifice equation change for a hole that is not a circle (square or triangle shape for example)? Or is it the same?</a:t>
-            </a:r>
-          </a:p>
-          <a:p>
-            <a:r>
-              <a:rPr lang="en-US" dirty="0"/>
-              <a:t>Are we going to have assignments where we have to use all of these fluid mechanics equations/When will we use these equations</a:t>
-            </a:r>
-            <a:br>
-              <a:rPr lang="en-US" dirty="0"/>
-            </a:br>
-            <a:endParaRPr lang="en-US" dirty="0"/>
-          </a:p>
-        </p:txBody>
-      </p:sp>
-    </p:spTree>
-    <p:extLst>
-      <p:ext uri="{BB962C8B-B14F-4D97-AF65-F5344CB8AC3E}">
-        <p14:creationId xmlns:p14="http://schemas.microsoft.com/office/powerpoint/2010/main" val="62533383"/>
-      </p:ext>
-    </p:extLst>
-  </p:cSld>
-  <p:clrMapOvr>
-    <a:masterClrMapping/>
-  </p:clrMapOvr>
-  <p:transition>
-    <p:fade/>
-  </p:transition>
-  <p:timing>
-    <p:tnLst>
-      <p:par>
-        <p:cTn id="1" dur="indefinite" restart="never" nodeType="tmRoot">
-          <p:childTnLst>
-            <p:seq concurrent="1" nextAc="seek">
-              <p:cTn id="2" dur="indefinite" nodeType="mainSeq">
-                <p:childTnLst>
-                  <p:par>
-                    <p:cTn id="3" fill="hold">
-                      <p:stCondLst>
-                        <p:cond delay="indefinite"/>
-                      </p:stCondLst>
-                      <p:childTnLst>
-                        <p:par>
-                          <p:cTn id="4" fill="hold">
-                            <p:stCondLst>
-                              <p:cond delay="0"/>
-                            </p:stCondLst>
-                            <p:childTnLst>
-                              <p:par>
-                                <p:cTn id="5" presetID="1" presetClass="entr" presetSubtype="0" fill="hold" grpId="0" nodeType="clickEffect">
-                                  <p:stCondLst>
-                                    <p:cond delay="0"/>
-                                  </p:stCondLst>
-                                  <p:childTnLst>
-                                    <p:set>
-                                      <p:cBhvr>
-                                        <p:cTn id="6" dur="1" fill="hold">
-                                          <p:stCondLst>
-                                            <p:cond delay="0"/>
-                                          </p:stCondLst>
-                                        </p:cTn>
-                                        <p:tgtEl>
-                                          <p:spTgt spid="3">
-                                            <p:txEl>
-                                              <p:pRg st="0" end="0"/>
-                                            </p:txEl>
-                                          </p:spTgt>
-                                        </p:tgtEl>
-                                        <p:attrNameLst>
-                                          <p:attrName>style.visibility</p:attrName>
-                                        </p:attrNameLst>
-                                      </p:cBhvr>
-                                      <p:to>
-                                        <p:strVal val="visible"/>
-                                      </p:to>
-                                    </p:set>
-                                  </p:childTnLst>
-                                </p:cTn>
-                              </p:par>
-                            </p:childTnLst>
-                          </p:cTn>
-                        </p:par>
-                      </p:childTnLst>
-                    </p:cTn>
-                  </p:par>
-                  <p:par>
-                    <p:cTn id="7" fill="hold">
-                      <p:stCondLst>
-                        <p:cond delay="indefinite"/>
-                      </p:stCondLst>
-                      <p:childTnLst>
-                        <p:par>
-                          <p:cTn id="8" fill="hold">
-                            <p:stCondLst>
-                              <p:cond delay="0"/>
-                            </p:stCondLst>
-                            <p:childTnLst>
-                              <p:par>
-                                <p:cTn id="9" presetID="1" presetClass="entr" presetSubtype="0" fill="hold" grpId="0" nodeType="clickEffect">
-                                  <p:stCondLst>
-                                    <p:cond delay="0"/>
-                                  </p:stCondLst>
-                                  <p:childTnLst>
-                                    <p:set>
-                                      <p:cBhvr>
-                                        <p:cTn id="10" dur="1" fill="hold">
-                                          <p:stCondLst>
-                                            <p:cond delay="0"/>
-                                          </p:stCondLst>
-                                        </p:cTn>
-                                        <p:tgtEl>
-                                          <p:spTgt spid="3">
-                                            <p:txEl>
-                                              <p:pRg st="1" end="1"/>
-                                            </p:txEl>
-                                          </p:spTgt>
-                                        </p:tgtEl>
-                                        <p:attrNameLst>
-                                          <p:attrName>style.visibility</p:attrName>
-                                        </p:attrNameLst>
-                                      </p:cBhvr>
-                                      <p:to>
-                                        <p:strVal val="visible"/>
-                                      </p:to>
-                                    </p:set>
-                                  </p:childTnLst>
-                                </p:cTn>
-                              </p:par>
-                            </p:childTnLst>
-                          </p:cTn>
-                        </p:par>
-                      </p:childTnLst>
-                    </p:cTn>
-                  </p:par>
-                  <p:par>
-                    <p:cTn id="11" fill="hold">
-                      <p:stCondLst>
-                        <p:cond delay="indefinite"/>
-                      </p:stCondLst>
-                      <p:childTnLst>
-                        <p:par>
-                          <p:cTn id="12" fill="hold">
-                            <p:stCondLst>
-                              <p:cond delay="0"/>
-                            </p:stCondLst>
-                            <p:childTnLst>
-                              <p:par>
-                                <p:cTn id="13" presetID="1" presetClass="entr" presetSubtype="0" fill="hold" grpId="0" nodeType="clickEffect">
-                                  <p:stCondLst>
-                                    <p:cond delay="0"/>
-                                  </p:stCondLst>
-                                  <p:childTnLst>
-                                    <p:set>
-                                      <p:cBhvr>
-                                        <p:cTn id="14" dur="1" fill="hold">
-                                          <p:stCondLst>
-                                            <p:cond delay="0"/>
-                                          </p:stCondLst>
-                                        </p:cTn>
-                                        <p:tgtEl>
-                                          <p:spTgt spid="3">
-                                            <p:txEl>
-                                              <p:pRg st="2" end="2"/>
-                                            </p:txEl>
-                                          </p:spTgt>
-                                        </p:tgtEl>
-                                        <p:attrNameLst>
-                                          <p:attrName>style.visibility</p:attrName>
-                                        </p:attrNameLst>
-                                      </p:cBhvr>
-                                      <p:to>
-                                        <p:strVal val="visible"/>
-                                      </p:to>
-                                    </p:set>
-                                  </p:childTnLst>
-                                </p:cTn>
-                              </p:par>
-                            </p:childTnLst>
-                          </p:cTn>
-                        </p:par>
-                      </p:childTnLst>
-                    </p:cTn>
-                  </p:par>
-                  <p:par>
-                    <p:cTn id="15" fill="hold">
-                      <p:stCondLst>
-                        <p:cond delay="indefinite"/>
-                      </p:stCondLst>
-                      <p:childTnLst>
-                        <p:par>
-                          <p:cTn id="16" fill="hold">
-                            <p:stCondLst>
-                              <p:cond delay="0"/>
-                            </p:stCondLst>
-                            <p:childTnLst>
-                              <p:par>
-                                <p:cTn id="17" presetID="1" presetClass="entr" presetSubtype="0" fill="hold" grpId="0" nodeType="clickEffect">
-                                  <p:stCondLst>
-                                    <p:cond delay="0"/>
-                                  </p:stCondLst>
-                                  <p:childTnLst>
-                                    <p:set>
-                                      <p:cBhvr>
-                                        <p:cTn id="18" dur="1" fill="hold">
-                                          <p:stCondLst>
-                                            <p:cond delay="0"/>
-                                          </p:stCondLst>
-                                        </p:cTn>
-                                        <p:tgtEl>
-                                          <p:spTgt spid="3">
-                                            <p:txEl>
-                                              <p:pRg st="3" end="3"/>
-                                            </p:txEl>
-                                          </p:spTgt>
-                                        </p:tgtEl>
-                                        <p:attrNameLst>
-                                          <p:attrName>style.visibility</p:attrName>
-                                        </p:attrNameLst>
-                                      </p:cBhvr>
-                                      <p:to>
-                                        <p:strVal val="visible"/>
-                                      </p:to>
-                                    </p:set>
-                                  </p:childTnLst>
-                                </p:cTn>
-                              </p:par>
-                            </p:childTnLst>
-                          </p:cTn>
-                        </p:par>
-                      </p:childTnLst>
-                    </p:cTn>
-                  </p:par>
-                </p:childTnLst>
-              </p:cTn>
-              <p:prevCondLst>
-                <p:cond evt="onPrev" delay="0">
-                  <p:tgtEl>
-                    <p:sldTgt/>
-                  </p:tgtEl>
-                </p:cond>
-              </p:prevCondLst>
-              <p:nextCondLst>
-                <p:cond evt="onNext" delay="0">
-                  <p:tgtEl>
-                    <p:sldTgt/>
-                  </p:tgtEl>
-                </p:cond>
-              </p:nextCondLst>
-            </p:seq>
-          </p:childTnLst>
-        </p:cTn>
-      </p:par>
-    </p:tnLst>
-    <p:bldLst>
-      <p:bldP spid="3" grpId="0" build="p"/>
-    </p:bldLst>
-  </p:timing>
-</p:sld>
-</file>
-
-<file path=ppt/slides/slide3.xml><?xml version="1.0" encoding="utf-8"?>
-<p:sld xmlns:a="http://schemas.openxmlformats.org/drawingml/2006/main" xmlns:r="http://schemas.openxmlformats.org/officeDocument/2006/relationships" xmlns:p="http://schemas.openxmlformats.org/presentationml/2006/main">
-  <p:cSld>
-    <p:spTree>
-      <p:nvGrpSpPr>
-        <p:cNvPr id="1" name=""/>
-        <p:cNvGrpSpPr/>
-        <p:nvPr/>
-      </p:nvGrpSpPr>
-      <p:grpSpPr>
-        <a:xfrm>
-          <a:off x="0" y="0"/>
-          <a:ext cx="0" cy="0"/>
-          <a:chOff x="0" y="0"/>
-          <a:chExt cx="0" cy="0"/>
-        </a:xfrm>
-      </p:grpSpPr>
-      <p:sp>
-        <p:nvSpPr>
-          <p:cNvPr id="2" name="Title 1">
-            <a:extLst>
-              <a:ext uri="{FF2B5EF4-FFF2-40B4-BE49-F238E27FC236}">
-                <a16:creationId xmlns:a16="http://schemas.microsoft.com/office/drawing/2014/main" id="{365ACAF3-CE39-4FE0-9E3C-B8DCF1B45108}"/>
-              </a:ext>
-            </a:extLst>
-          </p:cNvPr>
-          <p:cNvSpPr>
-            <a:spLocks noGrp="1"/>
-          </p:cNvSpPr>
-          <p:nvPr>
-            <p:ph type="title"/>
-          </p:nvPr>
-        </p:nvSpPr>
-        <p:spPr/>
-        <p:txBody>
-          <a:bodyPr/>
-          <a:lstStyle/>
-          <a:p>
-            <a:r>
-              <a:rPr lang="en-US" dirty="0"/>
-              <a:t>Fluids questions</a:t>
-            </a:r>
-          </a:p>
-        </p:txBody>
-      </p:sp>
-      <p:sp>
-        <p:nvSpPr>
-          <p:cNvPr id="3" name="Content Placeholder 2">
-            <a:extLst>
-              <a:ext uri="{FF2B5EF4-FFF2-40B4-BE49-F238E27FC236}">
-                <a16:creationId xmlns:a16="http://schemas.microsoft.com/office/drawing/2014/main" id="{5821BDF8-4A9F-45F8-86D9-E93A2AB1ACBF}"/>
-              </a:ext>
-            </a:extLst>
-          </p:cNvPr>
-          <p:cNvSpPr>
-            <a:spLocks noGrp="1"/>
-          </p:cNvSpPr>
-          <p:nvPr>
-            <p:ph idx="1"/>
-          </p:nvPr>
-        </p:nvSpPr>
-        <p:spPr/>
-        <p:txBody>
-          <a:bodyPr/>
-          <a:lstStyle/>
-          <a:p>
-            <a:r>
-              <a:rPr lang="en-US" dirty="0"/>
-              <a:t>How are turbidity and flow related? </a:t>
-            </a:r>
-          </a:p>
-          <a:p>
-            <a:r>
-              <a:rPr lang="en-US" dirty="0"/>
-              <a:t>Is it external and/or internal?</a:t>
-            </a:r>
-          </a:p>
-          <a:p>
-            <a:r>
-              <a:rPr lang="en-US" dirty="0"/>
-              <a:t>Is low viscosity ideal?</a:t>
-            </a:r>
-          </a:p>
-          <a:p>
-            <a:r>
-              <a:rPr lang="en-US" dirty="0"/>
-              <a:t>I think I'm confused on all the pressures and head losses that are considered when determining the flow through a pipe.</a:t>
-            </a:r>
-          </a:p>
-          <a:p>
-            <a:endParaRPr lang="en-US" dirty="0"/>
-          </a:p>
-        </p:txBody>
-      </p:sp>
-    </p:spTree>
-    <p:extLst>
-      <p:ext uri="{BB962C8B-B14F-4D97-AF65-F5344CB8AC3E}">
-        <p14:creationId xmlns:p14="http://schemas.microsoft.com/office/powerpoint/2010/main" val="2821267295"/>
-      </p:ext>
-    </p:extLst>
-  </p:cSld>
-  <p:clrMapOvr>
-    <a:masterClrMapping/>
-  </p:clrMapOvr>
-  <p:transition>
-    <p:fade/>
-  </p:transition>
-  <p:timing>
-    <p:tnLst>
-      <p:par>
-        <p:cTn id="1" dur="indefinite" restart="never" nodeType="tmRoot">
-          <p:childTnLst>
-            <p:seq concurrent="1" nextAc="seek">
-              <p:cTn id="2" dur="indefinite" nodeType="mainSeq">
-                <p:childTnLst>
-                  <p:par>
-                    <p:cTn id="3" fill="hold">
-                      <p:stCondLst>
-                        <p:cond delay="indefinite"/>
-                      </p:stCondLst>
-                      <p:childTnLst>
-                        <p:par>
-                          <p:cTn id="4" fill="hold">
-                            <p:stCondLst>
-                              <p:cond delay="0"/>
-                            </p:stCondLst>
-                            <p:childTnLst>
-                              <p:par>
-                                <p:cTn id="5" presetID="1" presetClass="entr" presetSubtype="0" fill="hold" grpId="0" nodeType="clickEffect">
-                                  <p:stCondLst>
-                                    <p:cond delay="0"/>
-                                  </p:stCondLst>
-                                  <p:childTnLst>
-                                    <p:set>
-                                      <p:cBhvr>
-                                        <p:cTn id="6" dur="1" fill="hold">
-                                          <p:stCondLst>
-                                            <p:cond delay="0"/>
-                                          </p:stCondLst>
-                                        </p:cTn>
-                                        <p:tgtEl>
-                                          <p:spTgt spid="3">
-                                            <p:txEl>
-                                              <p:pRg st="0" end="0"/>
-                                            </p:txEl>
-                                          </p:spTgt>
-                                        </p:tgtEl>
-                                        <p:attrNameLst>
-                                          <p:attrName>style.visibility</p:attrName>
-                                        </p:attrNameLst>
-                                      </p:cBhvr>
-                                      <p:to>
-                                        <p:strVal val="visible"/>
-                                      </p:to>
-                                    </p:set>
-                                  </p:childTnLst>
-                                </p:cTn>
-                              </p:par>
-                            </p:childTnLst>
-                          </p:cTn>
-                        </p:par>
-                      </p:childTnLst>
-                    </p:cTn>
-                  </p:par>
-                  <p:par>
-                    <p:cTn id="7" fill="hold">
-                      <p:stCondLst>
-                        <p:cond delay="indefinite"/>
-                      </p:stCondLst>
-                      <p:childTnLst>
-                        <p:par>
-                          <p:cTn id="8" fill="hold">
-                            <p:stCondLst>
-                              <p:cond delay="0"/>
-                            </p:stCondLst>
-                            <p:childTnLst>
-                              <p:par>
-                                <p:cTn id="9" presetID="1" presetClass="entr" presetSubtype="0" fill="hold" grpId="0" nodeType="clickEffect">
-                                  <p:stCondLst>
-                                    <p:cond delay="0"/>
-                                  </p:stCondLst>
-                                  <p:childTnLst>
-                                    <p:set>
-                                      <p:cBhvr>
-                                        <p:cTn id="10" dur="1" fill="hold">
-                                          <p:stCondLst>
-                                            <p:cond delay="0"/>
-                                          </p:stCondLst>
-                                        </p:cTn>
-                                        <p:tgtEl>
-                                          <p:spTgt spid="3">
-                                            <p:txEl>
-                                              <p:pRg st="1" end="1"/>
-                                            </p:txEl>
-                                          </p:spTgt>
-                                        </p:tgtEl>
-                                        <p:attrNameLst>
-                                          <p:attrName>style.visibility</p:attrName>
-                                        </p:attrNameLst>
-                                      </p:cBhvr>
-                                      <p:to>
-                                        <p:strVal val="visible"/>
-                                      </p:to>
-                                    </p:set>
-                                  </p:childTnLst>
-                                </p:cTn>
-                              </p:par>
-                            </p:childTnLst>
-                          </p:cTn>
-                        </p:par>
-                      </p:childTnLst>
-                    </p:cTn>
-                  </p:par>
-                  <p:par>
-                    <p:cTn id="11" fill="hold">
-                      <p:stCondLst>
-                        <p:cond delay="indefinite"/>
-                      </p:stCondLst>
-                      <p:childTnLst>
-                        <p:par>
-                          <p:cTn id="12" fill="hold">
-                            <p:stCondLst>
-                              <p:cond delay="0"/>
-                            </p:stCondLst>
-                            <p:childTnLst>
-                              <p:par>
-                                <p:cTn id="13" presetID="1" presetClass="entr" presetSubtype="0" fill="hold" grpId="0" nodeType="clickEffect">
-                                  <p:stCondLst>
-                                    <p:cond delay="0"/>
-                                  </p:stCondLst>
-                                  <p:childTnLst>
-                                    <p:set>
-                                      <p:cBhvr>
-                                        <p:cTn id="14" dur="1" fill="hold">
-                                          <p:stCondLst>
-                                            <p:cond delay="0"/>
-                                          </p:stCondLst>
-                                        </p:cTn>
-                                        <p:tgtEl>
-                                          <p:spTgt spid="3">
-                                            <p:txEl>
-                                              <p:pRg st="2" end="2"/>
-                                            </p:txEl>
-                                          </p:spTgt>
-                                        </p:tgtEl>
-                                        <p:attrNameLst>
-                                          <p:attrName>style.visibility</p:attrName>
-                                        </p:attrNameLst>
-                                      </p:cBhvr>
-                                      <p:to>
-                                        <p:strVal val="visible"/>
-                                      </p:to>
-                                    </p:set>
-                                  </p:childTnLst>
-                                </p:cTn>
-                              </p:par>
-                            </p:childTnLst>
-                          </p:cTn>
-                        </p:par>
-                      </p:childTnLst>
-                    </p:cTn>
-                  </p:par>
-                  <p:par>
-                    <p:cTn id="15" fill="hold">
-                      <p:stCondLst>
-                        <p:cond delay="indefinite"/>
-                      </p:stCondLst>
-                      <p:childTnLst>
-                        <p:par>
-                          <p:cTn id="16" fill="hold">
-                            <p:stCondLst>
-                              <p:cond delay="0"/>
-                            </p:stCondLst>
-                            <p:childTnLst>
-                              <p:par>
-                                <p:cTn id="17" presetID="1" presetClass="entr" presetSubtype="0" fill="hold" grpId="0" nodeType="clickEffect">
-                                  <p:stCondLst>
-                                    <p:cond delay="0"/>
-                                  </p:stCondLst>
-                                  <p:childTnLst>
-                                    <p:set>
-                                      <p:cBhvr>
-                                        <p:cTn id="18" dur="1" fill="hold">
-                                          <p:stCondLst>
-                                            <p:cond delay="0"/>
-                                          </p:stCondLst>
-                                        </p:cTn>
-                                        <p:tgtEl>
-                                          <p:spTgt spid="3">
-                                            <p:txEl>
-                                              <p:pRg st="3" end="3"/>
-                                            </p:txEl>
-                                          </p:spTgt>
-                                        </p:tgtEl>
-                                        <p:attrNameLst>
-                                          <p:attrName>style.visibility</p:attrName>
-                                        </p:attrNameLst>
-                                      </p:cBhvr>
-                                      <p:to>
-                                        <p:strVal val="visible"/>
-                                      </p:to>
-                                    </p:set>
-                                  </p:childTnLst>
-                                </p:cTn>
-                              </p:par>
-                            </p:childTnLst>
-                          </p:cTn>
-                        </p:par>
-                      </p:childTnLst>
-                    </p:cTn>
-                  </p:par>
-                </p:childTnLst>
-              </p:cTn>
-              <p:prevCondLst>
-                <p:cond evt="onPrev" delay="0">
-                  <p:tgtEl>
-                    <p:sldTgt/>
-                  </p:tgtEl>
-                </p:cond>
-              </p:prevCondLst>
-              <p:nextCondLst>
-                <p:cond evt="onNext" delay="0">
-                  <p:tgtEl>
-                    <p:sldTgt/>
-                  </p:tgtEl>
-                </p:cond>
-              </p:nextCondLst>
-            </p:seq>
-          </p:childTnLst>
-        </p:cTn>
-      </p:par>
-    </p:tnLst>
-    <p:bldLst>
-      <p:bldP spid="3" grpId="0" build="p"/>
-    </p:bldLst>
-  </p:timing>
-</p:sld>
-</file>
-
-<file path=ppt/slides/slide4.xml><?xml version="1.0" encoding="utf-8"?>
 <p:sld xmlns:a="http://schemas.openxmlformats.org/drawingml/2006/main" xmlns:r="http://schemas.openxmlformats.org/officeDocument/2006/relationships" xmlns:p="http://schemas.openxmlformats.org/presentationml/2006/main">
   <p:cSld>
     <p:spTree>
@@ -6102,7 +5027,7 @@
 </p:sld>
 </file>
 
-<file path=ppt/slides/slide5.xml><?xml version="1.0" encoding="utf-8"?>
+<file path=ppt/slides/slide2.xml><?xml version="1.0" encoding="utf-8"?>
 <p:sld xmlns:a="http://schemas.openxmlformats.org/drawingml/2006/main" xmlns:r="http://schemas.openxmlformats.org/officeDocument/2006/relationships" xmlns:p="http://schemas.openxmlformats.org/presentationml/2006/main">
   <p:cSld>
     <p:spTree>
@@ -47140,7 +46065,7 @@
 </p:sld>
 </file>
 
-<file path=ppt/slides/slide6.xml><?xml version="1.0" encoding="utf-8"?>
+<file path=ppt/slides/slide3.xml><?xml version="1.0" encoding="utf-8"?>
 <p:sld xmlns:a="http://schemas.openxmlformats.org/drawingml/2006/main" xmlns:r="http://schemas.openxmlformats.org/officeDocument/2006/relationships" xmlns:p="http://schemas.openxmlformats.org/presentationml/2006/main">
   <p:cSld>
     <p:spTree>
@@ -47455,7 +46380,7 @@
 </p:sld>
 </file>
 
-<file path=ppt/slides/slide7.xml><?xml version="1.0" encoding="utf-8"?>
+<file path=ppt/slides/slide4.xml><?xml version="1.0" encoding="utf-8"?>
 <p:sld xmlns:a="http://schemas.openxmlformats.org/drawingml/2006/main" xmlns:r="http://schemas.openxmlformats.org/officeDocument/2006/relationships" xmlns:p="http://schemas.openxmlformats.org/presentationml/2006/main">
   <p:cSld>
     <p:spTree>
@@ -48210,7 +47135,7 @@
 </p:sld>
 </file>
 
-<file path=ppt/slides/slide8.xml><?xml version="1.0" encoding="utf-8"?>
+<file path=ppt/slides/slide5.xml><?xml version="1.0" encoding="utf-8"?>
 <p:sld xmlns:a="http://schemas.openxmlformats.org/drawingml/2006/main" xmlns:r="http://schemas.openxmlformats.org/officeDocument/2006/relationships" xmlns:p="http://schemas.openxmlformats.org/presentationml/2006/main">
   <p:cSld>
     <p:spTree>
@@ -48379,7 +47304,7 @@
 </p:sld>
 </file>
 
-<file path=ppt/slides/slide9.xml><?xml version="1.0" encoding="utf-8"?>
+<file path=ppt/slides/slide6.xml><?xml version="1.0" encoding="utf-8"?>
 <p:sld xmlns:a="http://schemas.openxmlformats.org/drawingml/2006/main" xmlns:r="http://schemas.openxmlformats.org/officeDocument/2006/relationships" xmlns:p="http://schemas.openxmlformats.org/presentationml/2006/main">
   <p:cSld>
     <p:spTree>

</xml_diff>